<commit_message>
Update Lisbon 2 Dictionaries.pptx
</commit_message>
<xml_diff>
--- a/Events/LSSL2022/CourseMaterial/Lisbon 2 Dictionaries.pptx
+++ b/Events/LSSL2022/CourseMaterial/Lisbon 2 Dictionaries.pptx
@@ -8259,7 +8259,7 @@
           <a:p>
             <a:fld id="{60D9C778-B7C0-CD46-A0D8-B657C409AB14}" type="datetimeFigureOut">
               <a:rPr lang="fr-FR" smtClean="0"/>
-              <a:t>04/07/2022</a:t>
+              <a:t>05/07/2022</a:t>
             </a:fld>
             <a:endParaRPr lang="fr-FR"/>
           </a:p>
@@ -8424,7 +8424,7 @@
           <a:p>
             <a:fld id="{0241B261-1266-6B4C-99F5-087F4891DA7F}" type="datetimeFigureOut">
               <a:rPr lang="fr-FR" smtClean="0"/>
-              <a:t>04/07/2022</a:t>
+              <a:t>05/07/2022</a:t>
             </a:fld>
             <a:endParaRPr lang="fr-FR"/>
           </a:p>
@@ -8722,14 +8722,14 @@
           <a:noFill/>
           <a:extLst>
             <a:ext uri="{909E8E84-426E-40dd-AFC4-6F175D3DCCD1}">
-              <a14:hiddenFill xmlns="" xmlns:a14="http://schemas.microsoft.com/office/drawing/2010/main">
+              <a14:hiddenFill xmlns:a14="http://schemas.microsoft.com/office/drawing/2010/main" xmlns="">
                 <a:solidFill>
                   <a:srgbClr val="FFFFFF"/>
                 </a:solidFill>
               </a14:hiddenFill>
             </a:ext>
             <a:ext uri="{91240B29-F687-4f45-9708-019B960494DF}">
-              <a14:hiddenLine xmlns="" xmlns:a14="http://schemas.microsoft.com/office/drawing/2010/main" w="9525">
+              <a14:hiddenLine xmlns:a14="http://schemas.microsoft.com/office/drawing/2010/main" xmlns="" w="9525">
                 <a:solidFill>
                   <a:srgbClr val="000000"/>
                 </a:solidFill>
@@ -8888,7 +8888,7 @@
           </a:ln>
           <a:extLst>
             <a:ext uri="{FAA26D3D-D897-4be2-8F04-BA451C77F1D7}">
-              <ma14:placeholderFlag xmlns="" xmlns:ma14="http://schemas.microsoft.com/office/mac/drawingml/2011/main" val="1"/>
+              <ma14:placeholderFlag xmlns:ma14="http://schemas.microsoft.com/office/mac/drawingml/2011/main" xmlns="" val="1"/>
             </a:ext>
           </a:extLst>
         </p:spPr>
@@ -8917,7 +8917,7 @@
           </a:ln>
           <a:extLst>
             <a:ext uri="{FAA26D3D-D897-4be2-8F04-BA451C77F1D7}">
-              <ma14:placeholderFlag xmlns="" xmlns:ma14="http://schemas.microsoft.com/office/mac/drawingml/2011/main" val="1"/>
+              <ma14:placeholderFlag xmlns:ma14="http://schemas.microsoft.com/office/mac/drawingml/2011/main" xmlns="" val="1"/>
             </a:ext>
           </a:extLst>
         </p:spPr>
@@ -9230,7 +9230,7 @@
           <a:p>
             <a:fld id="{5FBC8024-F767-0648-8C2E-5E8679A0AE78}" type="datetimeFigureOut">
               <a:rPr lang="fr-FR" smtClean="0"/>
-              <a:t>04/07/2022</a:t>
+              <a:t>05/07/2022</a:t>
             </a:fld>
             <a:endParaRPr lang="fr-FR"/>
           </a:p>
@@ -9398,7 +9398,7 @@
           <a:p>
             <a:fld id="{5FBC8024-F767-0648-8C2E-5E8679A0AE78}" type="datetimeFigureOut">
               <a:rPr lang="fr-FR" smtClean="0"/>
-              <a:t>04/07/2022</a:t>
+              <a:t>05/07/2022</a:t>
             </a:fld>
             <a:endParaRPr lang="fr-FR"/>
           </a:p>
@@ -9576,7 +9576,7 @@
           <a:p>
             <a:fld id="{5FBC8024-F767-0648-8C2E-5E8679A0AE78}" type="datetimeFigureOut">
               <a:rPr lang="fr-FR" smtClean="0"/>
-              <a:t>04/07/2022</a:t>
+              <a:t>05/07/2022</a:t>
             </a:fld>
             <a:endParaRPr lang="fr-FR"/>
           </a:p>
@@ -9744,7 +9744,7 @@
           <a:p>
             <a:fld id="{5FBC8024-F767-0648-8C2E-5E8679A0AE78}" type="datetimeFigureOut">
               <a:rPr lang="fr-FR" smtClean="0"/>
-              <a:t>04/07/2022</a:t>
+              <a:t>05/07/2022</a:t>
             </a:fld>
             <a:endParaRPr lang="fr-FR"/>
           </a:p>
@@ -9989,7 +9989,7 @@
           <a:p>
             <a:fld id="{5FBC8024-F767-0648-8C2E-5E8679A0AE78}" type="datetimeFigureOut">
               <a:rPr lang="fr-FR" smtClean="0"/>
-              <a:t>04/07/2022</a:t>
+              <a:t>05/07/2022</a:t>
             </a:fld>
             <a:endParaRPr lang="fr-FR"/>
           </a:p>
@@ -10274,7 +10274,7 @@
           <a:p>
             <a:fld id="{5FBC8024-F767-0648-8C2E-5E8679A0AE78}" type="datetimeFigureOut">
               <a:rPr lang="fr-FR" smtClean="0"/>
-              <a:t>04/07/2022</a:t>
+              <a:t>05/07/2022</a:t>
             </a:fld>
             <a:endParaRPr lang="fr-FR"/>
           </a:p>
@@ -10693,7 +10693,7 @@
           <a:p>
             <a:fld id="{5FBC8024-F767-0648-8C2E-5E8679A0AE78}" type="datetimeFigureOut">
               <a:rPr lang="fr-FR" smtClean="0"/>
-              <a:t>04/07/2022</a:t>
+              <a:t>05/07/2022</a:t>
             </a:fld>
             <a:endParaRPr lang="fr-FR"/>
           </a:p>
@@ -10810,7 +10810,7 @@
           <a:p>
             <a:fld id="{5FBC8024-F767-0648-8C2E-5E8679A0AE78}" type="datetimeFigureOut">
               <a:rPr lang="fr-FR" smtClean="0"/>
-              <a:t>04/07/2022</a:t>
+              <a:t>05/07/2022</a:t>
             </a:fld>
             <a:endParaRPr lang="fr-FR"/>
           </a:p>
@@ -10905,7 +10905,7 @@
           <a:p>
             <a:fld id="{5FBC8024-F767-0648-8C2E-5E8679A0AE78}" type="datetimeFigureOut">
               <a:rPr lang="fr-FR" smtClean="0"/>
-              <a:t>04/07/2022</a:t>
+              <a:t>05/07/2022</a:t>
             </a:fld>
             <a:endParaRPr lang="fr-FR"/>
           </a:p>
@@ -11180,7 +11180,7 @@
           <a:p>
             <a:fld id="{5FBC8024-F767-0648-8C2E-5E8679A0AE78}" type="datetimeFigureOut">
               <a:rPr lang="fr-FR" smtClean="0"/>
-              <a:t>04/07/2022</a:t>
+              <a:t>05/07/2022</a:t>
             </a:fld>
             <a:endParaRPr lang="fr-FR"/>
           </a:p>
@@ -11432,7 +11432,7 @@
           <a:p>
             <a:fld id="{5FBC8024-F767-0648-8C2E-5E8679A0AE78}" type="datetimeFigureOut">
               <a:rPr lang="fr-FR" smtClean="0"/>
-              <a:t>04/07/2022</a:t>
+              <a:t>05/07/2022</a:t>
             </a:fld>
             <a:endParaRPr lang="fr-FR"/>
           </a:p>
@@ -11643,7 +11643,7 @@
           <a:p>
             <a:fld id="{5FBC8024-F767-0648-8C2E-5E8679A0AE78}" type="datetimeFigureOut">
               <a:rPr lang="fr-FR" smtClean="0"/>
-              <a:t>04/07/2022</a:t>
+              <a:t>05/07/2022</a:t>
             </a:fld>
             <a:endParaRPr lang="fr-FR"/>
           </a:p>
@@ -15829,7 +15829,7 @@
               <a:t>Keilriemen</a:t>
             </a:r>
             <a:r>
-              <a:rPr lang="en-US" sz="1400" dirty="0">
+              <a:rPr lang="en-US" sz="1400">
                 <a:solidFill>
                   <a:srgbClr val="000096"/>
                 </a:solidFill>
@@ -15837,18 +15837,7 @@
                 <a:ea typeface="Courier"/>
                 <a:cs typeface="Courier"/>
               </a:rPr>
-              <a:t>&lt;/</a:t>
-            </a:r>
-            <a:r>
-              <a:rPr lang="en-US" sz="1400" dirty="0" err="1">
-                <a:solidFill>
-                  <a:srgbClr val="000096"/>
-                </a:solidFill>
-                <a:latin typeface="Courier"/>
-                <a:ea typeface="Courier"/>
-                <a:cs typeface="Courier"/>
-              </a:rPr>
-              <a:t>tei:term</a:t>
+              <a:t>&lt;/term</a:t>
             </a:r>
             <a:r>
               <a:rPr lang="en-US" sz="1400" dirty="0">

</xml_diff>